<commit_message>
Restored PPtx version 1 from email
</commit_message>
<xml_diff>
--- a/Secure Online Voting.pptx
+++ b/Secure Online Voting.pptx
@@ -9,12 +9,16 @@
     <p:sldId id="257" r:id="rId3"/>
     <p:sldId id="258" r:id="rId4"/>
     <p:sldId id="259" r:id="rId5"/>
-    <p:sldId id="260" r:id="rId6"/>
-    <p:sldId id="262" r:id="rId7"/>
-    <p:sldId id="263" r:id="rId8"/>
-    <p:sldId id="264" r:id="rId9"/>
-    <p:sldId id="266" r:id="rId10"/>
-    <p:sldId id="268" r:id="rId11"/>
+    <p:sldId id="269" r:id="rId6"/>
+    <p:sldId id="260" r:id="rId7"/>
+    <p:sldId id="261" r:id="rId8"/>
+    <p:sldId id="262" r:id="rId9"/>
+    <p:sldId id="267" r:id="rId10"/>
+    <p:sldId id="263" r:id="rId11"/>
+    <p:sldId id="264" r:id="rId12"/>
+    <p:sldId id="265" r:id="rId13"/>
+    <p:sldId id="266" r:id="rId14"/>
+    <p:sldId id="268" r:id="rId15"/>
   </p:sldIdLst>
   <p:sldSz cx="12192000" cy="6858000"/>
   <p:notesSz cx="6858000" cy="9144000"/>
@@ -346,7 +350,7 @@
             <a:fld id="{5586B75A-687E-405C-8A0B-8D00578BA2C3}" type="datetimeFigureOut">
               <a:rPr lang="en-US" dirty="0"/>
               <a:pPr/>
-              <a:t>5/6/2020</a:t>
+              <a:t>4/29/2020</a:t>
             </a:fld>
             <a:endParaRPr lang="en-US" dirty="0"/>
           </a:p>
@@ -513,7 +517,7 @@
             <a:fld id="{5586B75A-687E-405C-8A0B-8D00578BA2C3}" type="datetimeFigureOut">
               <a:rPr lang="en-US" dirty="0"/>
               <a:pPr/>
-              <a:t>5/6/2020</a:t>
+              <a:t>4/29/2020</a:t>
             </a:fld>
             <a:endParaRPr lang="en-US" dirty="0"/>
           </a:p>
@@ -690,7 +694,7 @@
             <a:fld id="{5586B75A-687E-405C-8A0B-8D00578BA2C3}" type="datetimeFigureOut">
               <a:rPr lang="en-US" dirty="0"/>
               <a:pPr/>
-              <a:t>5/6/2020</a:t>
+              <a:t>4/29/2020</a:t>
             </a:fld>
             <a:endParaRPr lang="en-US" dirty="0"/>
           </a:p>
@@ -857,7 +861,7 @@
             <a:fld id="{5586B75A-687E-405C-8A0B-8D00578BA2C3}" type="datetimeFigureOut">
               <a:rPr lang="en-US" dirty="0"/>
               <a:pPr/>
-              <a:t>5/6/2020</a:t>
+              <a:t>4/29/2020</a:t>
             </a:fld>
             <a:endParaRPr lang="en-US" dirty="0"/>
           </a:p>
@@ -1112,7 +1116,7 @@
             <a:fld id="{5586B75A-687E-405C-8A0B-8D00578BA2C3}" type="datetimeFigureOut">
               <a:rPr lang="en-US" dirty="0"/>
               <a:pPr/>
-              <a:t>5/6/2020</a:t>
+              <a:t>4/29/2020</a:t>
             </a:fld>
             <a:endParaRPr lang="en-US" dirty="0"/>
           </a:p>
@@ -1397,7 +1401,7 @@
             <a:fld id="{5586B75A-687E-405C-8A0B-8D00578BA2C3}" type="datetimeFigureOut">
               <a:rPr lang="en-US" dirty="0"/>
               <a:pPr/>
-              <a:t>5/6/2020</a:t>
+              <a:t>4/29/2020</a:t>
             </a:fld>
             <a:endParaRPr lang="en-US" dirty="0"/>
           </a:p>
@@ -1836,7 +1840,7 @@
             <a:fld id="{5586B75A-687E-405C-8A0B-8D00578BA2C3}" type="datetimeFigureOut">
               <a:rPr lang="en-US" dirty="0"/>
               <a:pPr/>
-              <a:t>5/6/2020</a:t>
+              <a:t>4/29/2020</a:t>
             </a:fld>
             <a:endParaRPr lang="en-US" dirty="0"/>
           </a:p>
@@ -1951,7 +1955,7 @@
             <a:fld id="{5586B75A-687E-405C-8A0B-8D00578BA2C3}" type="datetimeFigureOut">
               <a:rPr lang="en-US" dirty="0"/>
               <a:pPr/>
-              <a:t>5/6/2020</a:t>
+              <a:t>4/29/2020</a:t>
             </a:fld>
             <a:endParaRPr lang="en-US" dirty="0"/>
           </a:p>
@@ -2043,7 +2047,7 @@
             <a:fld id="{5586B75A-687E-405C-8A0B-8D00578BA2C3}" type="datetimeFigureOut">
               <a:rPr lang="en-US" dirty="0"/>
               <a:pPr/>
-              <a:t>5/6/2020</a:t>
+              <a:t>4/29/2020</a:t>
             </a:fld>
             <a:endParaRPr lang="en-US" dirty="0"/>
           </a:p>
@@ -2328,7 +2332,7 @@
             <a:fld id="{5586B75A-687E-405C-8A0B-8D00578BA2C3}" type="datetimeFigureOut">
               <a:rPr lang="en-US" dirty="0"/>
               <a:pPr/>
-              <a:t>5/6/2020</a:t>
+              <a:t>4/29/2020</a:t>
             </a:fld>
             <a:endParaRPr lang="en-US" dirty="0"/>
           </a:p>
@@ -2597,7 +2601,7 @@
             <a:fld id="{5586B75A-687E-405C-8A0B-8D00578BA2C3}" type="datetimeFigureOut">
               <a:rPr lang="en-US" dirty="0"/>
               <a:pPr/>
-              <a:t>5/6/2020</a:t>
+              <a:t>4/29/2020</a:t>
             </a:fld>
             <a:endParaRPr lang="en-US" dirty="0"/>
           </a:p>
@@ -2891,7 +2895,7 @@
             <a:fld id="{5586B75A-687E-405C-8A0B-8D00578BA2C3}" type="datetimeFigureOut">
               <a:rPr lang="en-US" dirty="0"/>
               <a:pPr/>
-              <a:t>5/6/2020</a:t>
+              <a:t>4/29/2020</a:t>
             </a:fld>
             <a:endParaRPr lang="en-US" dirty="0"/>
           </a:p>
@@ -3487,889 +3491,10 @@
   <p:clrMapOvr>
     <a:masterClrMapping/>
   </p:clrMapOvr>
-  <mc:AlternateContent xmlns:mc="http://schemas.openxmlformats.org/markup-compatibility/2006" xmlns:p14="http://schemas.microsoft.com/office/powerpoint/2010/main">
-    <mc:Choice Requires="p14">
-      <p:transition spd="slow" p14:dur="2000" advTm="11191"/>
-    </mc:Choice>
-    <mc:Fallback xmlns="">
-      <p:transition spd="slow" advTm="11191"/>
-    </mc:Fallback>
-  </mc:AlternateContent>
 </p:sld>
 </file>
 
 <file path=ppt/slides/slide10.xml><?xml version="1.0" encoding="utf-8"?>
-<p:sld xmlns:a="http://schemas.openxmlformats.org/drawingml/2006/main" xmlns:r="http://schemas.openxmlformats.org/officeDocument/2006/relationships" xmlns:p="http://schemas.openxmlformats.org/presentationml/2006/main">
-  <p:cSld>
-    <p:spTree>
-      <p:nvGrpSpPr>
-        <p:cNvPr id="1" name=""/>
-        <p:cNvGrpSpPr/>
-        <p:nvPr/>
-      </p:nvGrpSpPr>
-      <p:grpSpPr>
-        <a:xfrm>
-          <a:off x="0" y="0"/>
-          <a:ext cx="0" cy="0"/>
-          <a:chOff x="0" y="0"/>
-          <a:chExt cx="0" cy="0"/>
-        </a:xfrm>
-      </p:grpSpPr>
-      <p:sp>
-        <p:nvSpPr>
-          <p:cNvPr id="4" name="Title 3">
-            <a:extLst>
-              <a:ext uri="{FF2B5EF4-FFF2-40B4-BE49-F238E27FC236}">
-                <a16:creationId xmlns:a16="http://schemas.microsoft.com/office/drawing/2014/main" id="{440EE3DF-0156-4E4D-A5B8-78D797526946}"/>
-              </a:ext>
-            </a:extLst>
-          </p:cNvPr>
-          <p:cNvSpPr>
-            <a:spLocks noGrp="1"/>
-          </p:cNvSpPr>
-          <p:nvPr>
-            <p:ph type="title"/>
-          </p:nvPr>
-        </p:nvSpPr>
-        <p:spPr/>
-        <p:txBody>
-          <a:bodyPr/>
-          <a:lstStyle/>
-          <a:p>
-            <a:r>
-              <a:rPr lang="en-US" dirty="0"/>
-              <a:t>Thank You!!</a:t>
-            </a:r>
-          </a:p>
-        </p:txBody>
-      </p:sp>
-      <p:pic>
-        <p:nvPicPr>
-          <p:cNvPr id="8" name="Picture Placeholder 7">
-            <a:extLst>
-              <a:ext uri="{FF2B5EF4-FFF2-40B4-BE49-F238E27FC236}">
-                <a16:creationId xmlns:a16="http://schemas.microsoft.com/office/drawing/2014/main" id="{E305FB75-300F-40B4-9551-1B39410723C6}"/>
-              </a:ext>
-            </a:extLst>
-          </p:cNvPr>
-          <p:cNvPicPr>
-            <a:picLocks noGrp="1" noChangeAspect="1"/>
-          </p:cNvPicPr>
-          <p:nvPr>
-            <p:ph type="pic" idx="1"/>
-          </p:nvPr>
-        </p:nvPicPr>
-        <p:blipFill>
-          <a:blip r:embed="rId2"/>
-          <a:stretch>
-            <a:fillRect/>
-          </a:stretch>
-        </p:blipFill>
-        <p:spPr>
-          <a:xfrm>
-            <a:off x="3570688" y="516646"/>
-            <a:ext cx="4546370" cy="5361828"/>
-          </a:xfrm>
-        </p:spPr>
-      </p:pic>
-      <p:sp>
-        <p:nvSpPr>
-          <p:cNvPr id="6" name="Text Placeholder 5">
-            <a:extLst>
-              <a:ext uri="{FF2B5EF4-FFF2-40B4-BE49-F238E27FC236}">
-                <a16:creationId xmlns:a16="http://schemas.microsoft.com/office/drawing/2014/main" id="{CE7A778D-DFEF-443A-8C2B-A203EB65EA5A}"/>
-              </a:ext>
-            </a:extLst>
-          </p:cNvPr>
-          <p:cNvSpPr>
-            <a:spLocks noGrp="1"/>
-          </p:cNvSpPr>
-          <p:nvPr>
-            <p:ph type="body" sz="half" idx="2"/>
-          </p:nvPr>
-        </p:nvSpPr>
-        <p:spPr/>
-        <p:txBody>
-          <a:bodyPr/>
-          <a:lstStyle/>
-          <a:p>
-            <a:endParaRPr lang="en-US" dirty="0"/>
-          </a:p>
-        </p:txBody>
-      </p:sp>
-    </p:spTree>
-    <p:extLst>
-      <p:ext uri="{BB962C8B-B14F-4D97-AF65-F5344CB8AC3E}">
-        <p14:creationId xmlns:p14="http://schemas.microsoft.com/office/powerpoint/2010/main" val="3300038344"/>
-      </p:ext>
-    </p:extLst>
-  </p:cSld>
-  <p:clrMapOvr>
-    <a:masterClrMapping/>
-  </p:clrMapOvr>
-  <mc:AlternateContent xmlns:mc="http://schemas.openxmlformats.org/markup-compatibility/2006" xmlns:p14="http://schemas.microsoft.com/office/powerpoint/2010/main">
-    <mc:Choice Requires="p14">
-      <p:transition spd="slow" p14:dur="2000" advTm="4166"/>
-    </mc:Choice>
-    <mc:Fallback xmlns="">
-      <p:transition spd="slow" advTm="4166"/>
-    </mc:Fallback>
-  </mc:AlternateContent>
-</p:sld>
-</file>
-
-<file path=ppt/slides/slide2.xml><?xml version="1.0" encoding="utf-8"?>
-<p:sld xmlns:a="http://schemas.openxmlformats.org/drawingml/2006/main" xmlns:r="http://schemas.openxmlformats.org/officeDocument/2006/relationships" xmlns:p="http://schemas.openxmlformats.org/presentationml/2006/main">
-  <p:cSld>
-    <p:spTree>
-      <p:nvGrpSpPr>
-        <p:cNvPr id="1" name=""/>
-        <p:cNvGrpSpPr/>
-        <p:nvPr/>
-      </p:nvGrpSpPr>
-      <p:grpSpPr>
-        <a:xfrm>
-          <a:off x="0" y="0"/>
-          <a:ext cx="0" cy="0"/>
-          <a:chOff x="0" y="0"/>
-          <a:chExt cx="0" cy="0"/>
-        </a:xfrm>
-      </p:grpSpPr>
-      <p:sp>
-        <p:nvSpPr>
-          <p:cNvPr id="2" name="Title 1">
-            <a:extLst>
-              <a:ext uri="{FF2B5EF4-FFF2-40B4-BE49-F238E27FC236}">
-                <a16:creationId xmlns:a16="http://schemas.microsoft.com/office/drawing/2014/main" id="{84E2319C-8EEF-4612-A002-F1EA63C1840C}"/>
-              </a:ext>
-            </a:extLst>
-          </p:cNvPr>
-          <p:cNvSpPr>
-            <a:spLocks noGrp="1"/>
-          </p:cNvSpPr>
-          <p:nvPr>
-            <p:ph type="title"/>
-          </p:nvPr>
-        </p:nvSpPr>
-        <p:spPr/>
-        <p:txBody>
-          <a:bodyPr/>
-          <a:lstStyle/>
-          <a:p>
-            <a:r>
-              <a:rPr lang="en-US" dirty="0"/>
-              <a:t>Contents</a:t>
-            </a:r>
-          </a:p>
-        </p:txBody>
-      </p:sp>
-      <p:sp>
-        <p:nvSpPr>
-          <p:cNvPr id="3" name="Content Placeholder 2">
-            <a:extLst>
-              <a:ext uri="{FF2B5EF4-FFF2-40B4-BE49-F238E27FC236}">
-                <a16:creationId xmlns:a16="http://schemas.microsoft.com/office/drawing/2014/main" id="{A8B7FE18-6EEF-4666-A8B9-11F06F18F874}"/>
-              </a:ext>
-            </a:extLst>
-          </p:cNvPr>
-          <p:cNvSpPr>
-            <a:spLocks noGrp="1"/>
-          </p:cNvSpPr>
-          <p:nvPr>
-            <p:ph idx="1"/>
-          </p:nvPr>
-        </p:nvSpPr>
-        <p:spPr/>
-        <p:txBody>
-          <a:bodyPr/>
-          <a:lstStyle/>
-          <a:p>
-            <a:r>
-              <a:rPr lang="en-US" dirty="0"/>
-              <a:t>Introduction</a:t>
-            </a:r>
-          </a:p>
-          <a:p>
-            <a:r>
-              <a:rPr lang="en-US" dirty="0"/>
-              <a:t>Our System</a:t>
-            </a:r>
-          </a:p>
-          <a:p>
-            <a:r>
-              <a:rPr lang="en-US" dirty="0"/>
-              <a:t>Steps to be followed</a:t>
-            </a:r>
-          </a:p>
-          <a:p>
-            <a:r>
-              <a:rPr lang="en-US" dirty="0"/>
-              <a:t>Technology Leveraged</a:t>
-            </a:r>
-          </a:p>
-          <a:p>
-            <a:r>
-              <a:rPr lang="en-US" dirty="0"/>
-              <a:t>Target Audience</a:t>
-            </a:r>
-          </a:p>
-          <a:p>
-            <a:r>
-              <a:rPr lang="en-US" dirty="0"/>
-              <a:t>Screenshots</a:t>
-            </a:r>
-          </a:p>
-          <a:p>
-            <a:endParaRPr lang="en-US" dirty="0"/>
-          </a:p>
-        </p:txBody>
-      </p:sp>
-    </p:spTree>
-    <p:extLst>
-      <p:ext uri="{BB962C8B-B14F-4D97-AF65-F5344CB8AC3E}">
-        <p14:creationId xmlns:p14="http://schemas.microsoft.com/office/powerpoint/2010/main" val="3879172910"/>
-      </p:ext>
-    </p:extLst>
-  </p:cSld>
-  <p:clrMapOvr>
-    <a:masterClrMapping/>
-  </p:clrMapOvr>
-  <mc:AlternateContent xmlns:mc="http://schemas.openxmlformats.org/markup-compatibility/2006" xmlns:p14="http://schemas.microsoft.com/office/powerpoint/2010/main">
-    <mc:Choice Requires="p14">
-      <p:transition spd="slow" p14:dur="2000" advTm="10414"/>
-    </mc:Choice>
-    <mc:Fallback xmlns="">
-      <p:transition spd="slow" advTm="10414"/>
-    </mc:Fallback>
-  </mc:AlternateContent>
-</p:sld>
-</file>
-
-<file path=ppt/slides/slide3.xml><?xml version="1.0" encoding="utf-8"?>
-<p:sld xmlns:a="http://schemas.openxmlformats.org/drawingml/2006/main" xmlns:r="http://schemas.openxmlformats.org/officeDocument/2006/relationships" xmlns:p="http://schemas.openxmlformats.org/presentationml/2006/main">
-  <p:cSld>
-    <p:spTree>
-      <p:nvGrpSpPr>
-        <p:cNvPr id="1" name=""/>
-        <p:cNvGrpSpPr/>
-        <p:nvPr/>
-      </p:nvGrpSpPr>
-      <p:grpSpPr>
-        <a:xfrm>
-          <a:off x="0" y="0"/>
-          <a:ext cx="0" cy="0"/>
-          <a:chOff x="0" y="0"/>
-          <a:chExt cx="0" cy="0"/>
-        </a:xfrm>
-      </p:grpSpPr>
-      <p:sp>
-        <p:nvSpPr>
-          <p:cNvPr id="2" name="Title 1">
-            <a:extLst>
-              <a:ext uri="{FF2B5EF4-FFF2-40B4-BE49-F238E27FC236}">
-                <a16:creationId xmlns:a16="http://schemas.microsoft.com/office/drawing/2014/main" id="{18F57465-EF5E-4C75-AB29-19CD0FE6C830}"/>
-              </a:ext>
-            </a:extLst>
-          </p:cNvPr>
-          <p:cNvSpPr>
-            <a:spLocks noGrp="1"/>
-          </p:cNvSpPr>
-          <p:nvPr>
-            <p:ph type="title"/>
-          </p:nvPr>
-        </p:nvSpPr>
-        <p:spPr/>
-        <p:txBody>
-          <a:bodyPr/>
-          <a:lstStyle/>
-          <a:p>
-            <a:r>
-              <a:rPr lang="en-US" dirty="0"/>
-              <a:t>Introduction</a:t>
-            </a:r>
-          </a:p>
-        </p:txBody>
-      </p:sp>
-      <p:sp>
-        <p:nvSpPr>
-          <p:cNvPr id="3" name="Content Placeholder 2">
-            <a:extLst>
-              <a:ext uri="{FF2B5EF4-FFF2-40B4-BE49-F238E27FC236}">
-                <a16:creationId xmlns:a16="http://schemas.microsoft.com/office/drawing/2014/main" id="{53683710-77AF-42A5-95CA-6D9C074E85ED}"/>
-              </a:ext>
-            </a:extLst>
-          </p:cNvPr>
-          <p:cNvSpPr>
-            <a:spLocks noGrp="1"/>
-          </p:cNvSpPr>
-          <p:nvPr>
-            <p:ph idx="1"/>
-          </p:nvPr>
-        </p:nvSpPr>
-        <p:spPr/>
-        <p:txBody>
-          <a:bodyPr>
-            <a:normAutofit/>
-          </a:bodyPr>
-          <a:lstStyle/>
-          <a:p>
-            <a:r>
-              <a:rPr lang="en-US" dirty="0"/>
-              <a:t>Online voting or E-voting refers to voting using electronic means such as an android smartphone. </a:t>
-            </a:r>
-          </a:p>
-          <a:p>
-            <a:r>
-              <a:rPr lang="en-US" dirty="0"/>
-              <a:t>The project suggests the use of hashing. Authentication is made by comparing hashes using SHA-256. </a:t>
-            </a:r>
-          </a:p>
-          <a:p>
-            <a:r>
-              <a:rPr lang="en-US" dirty="0"/>
-              <a:t>This way the system is more secured. </a:t>
-            </a:r>
-          </a:p>
-          <a:p>
-            <a:r>
-              <a:rPr lang="en-US" dirty="0"/>
-              <a:t>Vote can be audited later by comparing hashes in a database.</a:t>
-            </a:r>
-          </a:p>
-        </p:txBody>
-      </p:sp>
-      <p:pic>
-        <p:nvPicPr>
-          <p:cNvPr id="4" name="output">
-            <a:hlinkClick r:id="" action="ppaction://media"/>
-            <a:extLst>
-              <a:ext uri="{FF2B5EF4-FFF2-40B4-BE49-F238E27FC236}">
-                <a16:creationId xmlns:a16="http://schemas.microsoft.com/office/drawing/2014/main" id="{3EA9E159-C10F-4DBE-B3F9-80B4281A4A06}"/>
-              </a:ext>
-            </a:extLst>
-          </p:cNvPr>
-          <p:cNvPicPr>
-            <a:picLocks noChangeAspect="1"/>
-          </p:cNvPicPr>
-          <p:nvPr>
-            <a:audioFile r:link="rId2"/>
-            <p:extLst>
-              <p:ext uri="{DAA4B4D4-6D71-4841-9C94-3DE7FCFB9230}">
-                <p14:media xmlns:p14="http://schemas.microsoft.com/office/powerpoint/2010/main" r:embed="rId1"/>
-              </p:ext>
-            </p:extLst>
-          </p:nvPr>
-        </p:nvPicPr>
-        <p:blipFill>
-          <a:blip r:embed="rId4"/>
-          <a:stretch>
-            <a:fillRect/>
-          </a:stretch>
-        </p:blipFill>
-        <p:spPr>
-          <a:xfrm>
-            <a:off x="3564468" y="1160996"/>
-            <a:ext cx="609600" cy="609600"/>
-          </a:xfrm>
-          <a:prstGeom prst="rect">
-            <a:avLst/>
-          </a:prstGeom>
-        </p:spPr>
-      </p:pic>
-    </p:spTree>
-    <p:extLst>
-      <p:ext uri="{BB962C8B-B14F-4D97-AF65-F5344CB8AC3E}">
-        <p14:creationId xmlns:p14="http://schemas.microsoft.com/office/powerpoint/2010/main" val="3124871287"/>
-      </p:ext>
-    </p:extLst>
-  </p:cSld>
-  <p:clrMapOvr>
-    <a:masterClrMapping/>
-  </p:clrMapOvr>
-  <mc:AlternateContent xmlns:mc="http://schemas.openxmlformats.org/markup-compatibility/2006" xmlns:p14="http://schemas.microsoft.com/office/powerpoint/2010/main">
-    <mc:Choice Requires="p14">
-      <p:transition spd="slow" p14:dur="2000" advTm="33242"/>
-    </mc:Choice>
-    <mc:Fallback xmlns="">
-      <p:transition spd="slow" advTm="33242"/>
-    </mc:Fallback>
-  </mc:AlternateContent>
-  <p:timing>
-    <p:tnLst>
-      <p:par>
-        <p:cTn id="1" dur="indefinite" restart="never" nodeType="tmRoot">
-          <p:childTnLst>
-            <p:seq concurrent="1" nextAc="seek">
-              <p:cTn id="2" dur="indefinite" nodeType="mainSeq">
-                <p:childTnLst>
-                  <p:par>
-                    <p:cTn id="3" fill="hold">
-                      <p:stCondLst>
-                        <p:cond delay="indefinite"/>
-                        <p:cond evt="onBegin" delay="0">
-                          <p:tn val="2"/>
-                        </p:cond>
-                      </p:stCondLst>
-                      <p:childTnLst>
-                        <p:par>
-                          <p:cTn id="4" fill="hold">
-                            <p:stCondLst>
-                              <p:cond delay="0"/>
-                            </p:stCondLst>
-                            <p:childTnLst>
-                              <p:par>
-                                <p:cTn id="5" presetID="1" presetClass="mediacall" presetSubtype="0" fill="hold" nodeType="afterEffect">
-                                  <p:stCondLst>
-                                    <p:cond delay="0"/>
-                                  </p:stCondLst>
-                                  <p:childTnLst>
-                                    <p:cmd type="call" cmd="playFrom(0.0)">
-                                      <p:cBhvr>
-                                        <p:cTn id="6" dur="34390" fill="hold"/>
-                                        <p:tgtEl>
-                                          <p:spTgt spid="4"/>
-                                        </p:tgtEl>
-                                      </p:cBhvr>
-                                    </p:cmd>
-                                  </p:childTnLst>
-                                </p:cTn>
-                              </p:par>
-                            </p:childTnLst>
-                          </p:cTn>
-                        </p:par>
-                      </p:childTnLst>
-                    </p:cTn>
-                  </p:par>
-                </p:childTnLst>
-              </p:cTn>
-              <p:prevCondLst>
-                <p:cond evt="onPrev" delay="0">
-                  <p:tgtEl>
-                    <p:sldTgt/>
-                  </p:tgtEl>
-                </p:cond>
-              </p:prevCondLst>
-              <p:nextCondLst>
-                <p:cond evt="onNext" delay="0">
-                  <p:tgtEl>
-                    <p:sldTgt/>
-                  </p:tgtEl>
-                </p:cond>
-              </p:nextCondLst>
-            </p:seq>
-            <p:audio>
-              <p:cMediaNode vol="80000">
-                <p:cTn id="7" fill="hold" display="0">
-                  <p:stCondLst>
-                    <p:cond delay="indefinite"/>
-                  </p:stCondLst>
-                  <p:endCondLst>
-                    <p:cond evt="onStopAudio" delay="0">
-                      <p:tgtEl>
-                        <p:sldTgt/>
-                      </p:tgtEl>
-                    </p:cond>
-                  </p:endCondLst>
-                </p:cTn>
-                <p:tgtEl>
-                  <p:spTgt spid="4"/>
-                </p:tgtEl>
-              </p:cMediaNode>
-            </p:audio>
-          </p:childTnLst>
-        </p:cTn>
-      </p:par>
-    </p:tnLst>
-  </p:timing>
-  <p:extLst>
-    <p:ext uri="{E180D4A7-C9FB-4DFB-919C-405C955672EB}">
-      <p14:showEvtLst xmlns:p14="http://schemas.microsoft.com/office/powerpoint/2010/main">
-        <p14:playEvt time="0" objId="4"/>
-        <p14:stopEvt time="33242" objId="4"/>
-      </p14:showEvtLst>
-    </p:ext>
-  </p:extLst>
-</p:sld>
-</file>
-
-<file path=ppt/slides/slide4.xml><?xml version="1.0" encoding="utf-8"?>
-<p:sld xmlns:a="http://schemas.openxmlformats.org/drawingml/2006/main" xmlns:r="http://schemas.openxmlformats.org/officeDocument/2006/relationships" xmlns:p="http://schemas.openxmlformats.org/presentationml/2006/main">
-  <p:cSld>
-    <p:spTree>
-      <p:nvGrpSpPr>
-        <p:cNvPr id="1" name=""/>
-        <p:cNvGrpSpPr/>
-        <p:nvPr/>
-      </p:nvGrpSpPr>
-      <p:grpSpPr>
-        <a:xfrm>
-          <a:off x="0" y="0"/>
-          <a:ext cx="0" cy="0"/>
-          <a:chOff x="0" y="0"/>
-          <a:chExt cx="0" cy="0"/>
-        </a:xfrm>
-      </p:grpSpPr>
-      <p:sp>
-        <p:nvSpPr>
-          <p:cNvPr id="2" name="Title 1">
-            <a:extLst>
-              <a:ext uri="{FF2B5EF4-FFF2-40B4-BE49-F238E27FC236}">
-                <a16:creationId xmlns:a16="http://schemas.microsoft.com/office/drawing/2014/main" id="{0E0238E9-3875-453D-B5ED-5CC39C754D28}"/>
-              </a:ext>
-            </a:extLst>
-          </p:cNvPr>
-          <p:cNvSpPr>
-            <a:spLocks noGrp="1"/>
-          </p:cNvSpPr>
-          <p:nvPr>
-            <p:ph type="title"/>
-          </p:nvPr>
-        </p:nvSpPr>
-        <p:spPr/>
-        <p:txBody>
-          <a:bodyPr/>
-          <a:lstStyle/>
-          <a:p>
-            <a:r>
-              <a:rPr lang="en-US" dirty="0"/>
-              <a:t>Our System</a:t>
-            </a:r>
-          </a:p>
-        </p:txBody>
-      </p:sp>
-      <p:sp>
-        <p:nvSpPr>
-          <p:cNvPr id="3" name="Content Placeholder 2">
-            <a:extLst>
-              <a:ext uri="{FF2B5EF4-FFF2-40B4-BE49-F238E27FC236}">
-                <a16:creationId xmlns:a16="http://schemas.microsoft.com/office/drawing/2014/main" id="{18CB6655-FC8B-4DE3-BF34-EE4D31141C84}"/>
-              </a:ext>
-            </a:extLst>
-          </p:cNvPr>
-          <p:cNvSpPr>
-            <a:spLocks noGrp="1"/>
-          </p:cNvSpPr>
-          <p:nvPr>
-            <p:ph idx="1"/>
-          </p:nvPr>
-        </p:nvSpPr>
-        <p:spPr/>
-        <p:txBody>
-          <a:bodyPr>
-            <a:normAutofit/>
-          </a:bodyPr>
-          <a:lstStyle/>
-          <a:p>
-            <a:r>
-              <a:rPr lang="en-US" dirty="0"/>
-              <a:t>Relevant agencies use the National Electoral Roll database to send all registered voters a letter with information about the voting process.</a:t>
-            </a:r>
-          </a:p>
-          <a:p>
-            <a:r>
-              <a:rPr lang="en-US" dirty="0"/>
-              <a:t>The user opens the app and scans 2 pieces of information from the letter:</a:t>
-            </a:r>
-          </a:p>
-          <a:p>
-            <a:r>
-              <a:rPr lang="en-US" dirty="0"/>
-              <a:t>1. Information that authenticates him and his vote</a:t>
-            </a:r>
-          </a:p>
-          <a:p>
-            <a:r>
-              <a:rPr lang="en-US" dirty="0"/>
-              <a:t>2. The code that indicates his vote</a:t>
-            </a:r>
-          </a:p>
-          <a:p>
-            <a:r>
-              <a:rPr lang="en-US" dirty="0"/>
-              <a:t>A ready-to-send email is generated with the two pieces of information. </a:t>
-            </a:r>
-          </a:p>
-          <a:p>
-            <a:r>
-              <a:rPr lang="en-US" dirty="0"/>
-              <a:t>The government can then audit the vote itself with the relevant information provided, ensuring a reliable and rigorous election.</a:t>
-            </a:r>
-          </a:p>
-          <a:p>
-            <a:endParaRPr lang="en-US" dirty="0"/>
-          </a:p>
-        </p:txBody>
-      </p:sp>
-    </p:spTree>
-    <p:extLst>
-      <p:ext uri="{BB962C8B-B14F-4D97-AF65-F5344CB8AC3E}">
-        <p14:creationId xmlns:p14="http://schemas.microsoft.com/office/powerpoint/2010/main" val="3945933373"/>
-      </p:ext>
-    </p:extLst>
-  </p:cSld>
-  <p:clrMapOvr>
-    <a:masterClrMapping/>
-  </p:clrMapOvr>
-  <mc:AlternateContent xmlns:mc="http://schemas.openxmlformats.org/markup-compatibility/2006" xmlns:p14="http://schemas.microsoft.com/office/powerpoint/2010/main">
-    <mc:Choice Requires="p14">
-      <p:transition spd="slow" p14:dur="2000" advTm="8184"/>
-    </mc:Choice>
-    <mc:Fallback xmlns="">
-      <p:transition spd="slow" advTm="8184"/>
-    </mc:Fallback>
-  </mc:AlternateContent>
-</p:sld>
-</file>
-
-<file path=ppt/slides/slide5.xml><?xml version="1.0" encoding="utf-8"?>
-<p:sld xmlns:a="http://schemas.openxmlformats.org/drawingml/2006/main" xmlns:r="http://schemas.openxmlformats.org/officeDocument/2006/relationships" xmlns:p="http://schemas.openxmlformats.org/presentationml/2006/main">
-  <p:cSld>
-    <p:spTree>
-      <p:nvGrpSpPr>
-        <p:cNvPr id="1" name=""/>
-        <p:cNvGrpSpPr/>
-        <p:nvPr/>
-      </p:nvGrpSpPr>
-      <p:grpSpPr>
-        <a:xfrm>
-          <a:off x="0" y="0"/>
-          <a:ext cx="0" cy="0"/>
-          <a:chOff x="0" y="0"/>
-          <a:chExt cx="0" cy="0"/>
-        </a:xfrm>
-      </p:grpSpPr>
-      <p:sp>
-        <p:nvSpPr>
-          <p:cNvPr id="2" name="Title 1">
-            <a:extLst>
-              <a:ext uri="{FF2B5EF4-FFF2-40B4-BE49-F238E27FC236}">
-                <a16:creationId xmlns:a16="http://schemas.microsoft.com/office/drawing/2014/main" id="{57E0BFE9-D4B8-4865-84D6-7CCF73C101C9}"/>
-              </a:ext>
-            </a:extLst>
-          </p:cNvPr>
-          <p:cNvSpPr>
-            <a:spLocks noGrp="1"/>
-          </p:cNvSpPr>
-          <p:nvPr>
-            <p:ph type="title"/>
-          </p:nvPr>
-        </p:nvSpPr>
-        <p:spPr/>
-        <p:txBody>
-          <a:bodyPr/>
-          <a:lstStyle/>
-          <a:p>
-            <a:r>
-              <a:rPr lang="en-US" dirty="0"/>
-              <a:t>Steps To Be Followed</a:t>
-            </a:r>
-          </a:p>
-        </p:txBody>
-      </p:sp>
-      <p:sp>
-        <p:nvSpPr>
-          <p:cNvPr id="3" name="Content Placeholder 2">
-            <a:extLst>
-              <a:ext uri="{FF2B5EF4-FFF2-40B4-BE49-F238E27FC236}">
-                <a16:creationId xmlns:a16="http://schemas.microsoft.com/office/drawing/2014/main" id="{608FE067-974F-45D1-A4B7-DDBCB66CDCE6}"/>
-              </a:ext>
-            </a:extLst>
-          </p:cNvPr>
-          <p:cNvSpPr>
-            <a:spLocks noGrp="1"/>
-          </p:cNvSpPr>
-          <p:nvPr>
-            <p:ph idx="1"/>
-          </p:nvPr>
-        </p:nvSpPr>
-        <p:spPr/>
-        <p:txBody>
-          <a:bodyPr/>
-          <a:lstStyle/>
-          <a:p>
-            <a:r>
-              <a:rPr lang="en-US" dirty="0"/>
-              <a:t>1. User receives a letter with scan-able information.</a:t>
-            </a:r>
-          </a:p>
-          <a:p>
-            <a:r>
-              <a:rPr lang="en-US" dirty="0"/>
-              <a:t>2. User opens the app and scans his own information as well as the candidate he chooses to vote for.</a:t>
-            </a:r>
-          </a:p>
-          <a:p>
-            <a:r>
-              <a:rPr lang="en-US" dirty="0"/>
-              <a:t>3. An email in the Gmail App is automatically generated with encrypted data.</a:t>
-            </a:r>
-          </a:p>
-          <a:p>
-            <a:r>
-              <a:rPr lang="en-US" dirty="0"/>
-              <a:t>4. The user sends this email.</a:t>
-            </a:r>
-          </a:p>
-          <a:p>
-            <a:r>
-              <a:rPr lang="en-US" dirty="0"/>
-              <a:t>5. Email received is used to count votes for candidates.</a:t>
-            </a:r>
-          </a:p>
-          <a:p>
-            <a:r>
-              <a:rPr lang="en-US" dirty="0"/>
-              <a:t>6. The received email is verified and will count as a single vote.</a:t>
-            </a:r>
-          </a:p>
-          <a:p>
-            <a:r>
-              <a:rPr lang="en-US" dirty="0"/>
-              <a:t>7. The vote can be audited by verifying hashed user information.</a:t>
-            </a:r>
-          </a:p>
-        </p:txBody>
-      </p:sp>
-    </p:spTree>
-    <p:extLst>
-      <p:ext uri="{BB962C8B-B14F-4D97-AF65-F5344CB8AC3E}">
-        <p14:creationId xmlns:p14="http://schemas.microsoft.com/office/powerpoint/2010/main" val="383123595"/>
-      </p:ext>
-    </p:extLst>
-  </p:cSld>
-  <p:clrMapOvr>
-    <a:masterClrMapping/>
-  </p:clrMapOvr>
-  <mc:AlternateContent xmlns:mc="http://schemas.openxmlformats.org/markup-compatibility/2006" xmlns:p14="http://schemas.microsoft.com/office/powerpoint/2010/main">
-    <mc:Choice Requires="p14">
-      <p:transition spd="slow" p14:dur="2000" advTm="6126"/>
-    </mc:Choice>
-    <mc:Fallback xmlns="">
-      <p:transition spd="slow" advTm="6126"/>
-    </mc:Fallback>
-  </mc:AlternateContent>
-</p:sld>
-</file>
-
-<file path=ppt/slides/slide6.xml><?xml version="1.0" encoding="utf-8"?>
-<p:sld xmlns:a="http://schemas.openxmlformats.org/drawingml/2006/main" xmlns:r="http://schemas.openxmlformats.org/officeDocument/2006/relationships" xmlns:p="http://schemas.openxmlformats.org/presentationml/2006/main">
-  <p:cSld>
-    <p:spTree>
-      <p:nvGrpSpPr>
-        <p:cNvPr id="1" name=""/>
-        <p:cNvGrpSpPr/>
-        <p:nvPr/>
-      </p:nvGrpSpPr>
-      <p:grpSpPr>
-        <a:xfrm>
-          <a:off x="0" y="0"/>
-          <a:ext cx="0" cy="0"/>
-          <a:chOff x="0" y="0"/>
-          <a:chExt cx="0" cy="0"/>
-        </a:xfrm>
-      </p:grpSpPr>
-      <p:sp>
-        <p:nvSpPr>
-          <p:cNvPr id="2" name="Title 1">
-            <a:extLst>
-              <a:ext uri="{FF2B5EF4-FFF2-40B4-BE49-F238E27FC236}">
-                <a16:creationId xmlns:a16="http://schemas.microsoft.com/office/drawing/2014/main" id="{61735F35-298B-4E05-9583-E47ED1617DB8}"/>
-              </a:ext>
-            </a:extLst>
-          </p:cNvPr>
-          <p:cNvSpPr>
-            <a:spLocks noGrp="1"/>
-          </p:cNvSpPr>
-          <p:nvPr>
-            <p:ph type="title"/>
-          </p:nvPr>
-        </p:nvSpPr>
-        <p:spPr/>
-        <p:txBody>
-          <a:bodyPr/>
-          <a:lstStyle/>
-          <a:p>
-            <a:r>
-              <a:rPr lang="en-US" dirty="0"/>
-              <a:t>Advantages</a:t>
-            </a:r>
-          </a:p>
-        </p:txBody>
-      </p:sp>
-      <p:sp>
-        <p:nvSpPr>
-          <p:cNvPr id="3" name="Content Placeholder 2">
-            <a:extLst>
-              <a:ext uri="{FF2B5EF4-FFF2-40B4-BE49-F238E27FC236}">
-                <a16:creationId xmlns:a16="http://schemas.microsoft.com/office/drawing/2014/main" id="{EE4021B6-3877-4CDF-AA92-9E221655B8DC}"/>
-              </a:ext>
-            </a:extLst>
-          </p:cNvPr>
-          <p:cNvSpPr>
-            <a:spLocks noGrp="1"/>
-          </p:cNvSpPr>
-          <p:nvPr>
-            <p:ph idx="1"/>
-          </p:nvPr>
-        </p:nvSpPr>
-        <p:spPr/>
-        <p:txBody>
-          <a:bodyPr/>
-          <a:lstStyle/>
-          <a:p>
-            <a:r>
-              <a:rPr lang="en-US" dirty="0"/>
-              <a:t>1. The system can be used anytime and from anywhere by the Voters.</a:t>
-            </a:r>
-          </a:p>
-          <a:p>
-            <a:r>
-              <a:rPr lang="en-US" dirty="0"/>
-              <a:t>2. No one can cast votes on behalf of others and multiple times.</a:t>
-            </a:r>
-          </a:p>
-          <a:p>
-            <a:r>
-              <a:rPr lang="en-US" dirty="0"/>
-              <a:t>3. Saves time and reduces human intervention.</a:t>
-            </a:r>
-          </a:p>
-          <a:p>
-            <a:r>
-              <a:rPr lang="en-US" dirty="0"/>
-              <a:t>4. The system is flexible and secured to be used.</a:t>
-            </a:r>
-          </a:p>
-          <a:p>
-            <a:r>
-              <a:rPr lang="en-US" dirty="0"/>
-              <a:t>5. Unique Identification of voter through user info hashes.</a:t>
-            </a:r>
-          </a:p>
-        </p:txBody>
-      </p:sp>
-    </p:spTree>
-    <p:extLst>
-      <p:ext uri="{BB962C8B-B14F-4D97-AF65-F5344CB8AC3E}">
-        <p14:creationId xmlns:p14="http://schemas.microsoft.com/office/powerpoint/2010/main" val="2294840840"/>
-      </p:ext>
-    </p:extLst>
-  </p:cSld>
-  <p:clrMapOvr>
-    <a:masterClrMapping/>
-  </p:clrMapOvr>
-  <mc:AlternateContent xmlns:mc="http://schemas.openxmlformats.org/markup-compatibility/2006" xmlns:p14="http://schemas.microsoft.com/office/powerpoint/2010/main">
-    <mc:Choice Requires="p14">
-      <p:transition spd="slow" p14:dur="2000" advTm="6502"/>
-    </mc:Choice>
-    <mc:Fallback xmlns="">
-      <p:transition spd="slow" advTm="6502"/>
-    </mc:Fallback>
-  </mc:AlternateContent>
-</p:sld>
-</file>
-
-<file path=ppt/slides/slide7.xml><?xml version="1.0" encoding="utf-8"?>
 <p:sld xmlns:a="http://schemas.openxmlformats.org/drawingml/2006/main" xmlns:r="http://schemas.openxmlformats.org/officeDocument/2006/relationships" xmlns:p="http://schemas.openxmlformats.org/presentationml/2006/main">
   <p:cSld>
     <p:spTree>
@@ -4538,18 +3663,10 @@
   <p:clrMapOvr>
     <a:masterClrMapping/>
   </p:clrMapOvr>
-  <mc:AlternateContent xmlns:mc="http://schemas.openxmlformats.org/markup-compatibility/2006" xmlns:p14="http://schemas.microsoft.com/office/powerpoint/2010/main">
-    <mc:Choice Requires="p14">
-      <p:transition spd="slow" p14:dur="2000" advTm="21241"/>
-    </mc:Choice>
-    <mc:Fallback xmlns="">
-      <p:transition spd="slow" advTm="21241"/>
-    </mc:Fallback>
-  </mc:AlternateContent>
 </p:sld>
 </file>
 
-<file path=ppt/slides/slide8.xml><?xml version="1.0" encoding="utf-8"?>
+<file path=ppt/slides/slide11.xml><?xml version="1.0" encoding="utf-8"?>
 <p:sld xmlns:a="http://schemas.openxmlformats.org/drawingml/2006/main" xmlns:r="http://schemas.openxmlformats.org/officeDocument/2006/relationships" xmlns:p="http://schemas.openxmlformats.org/presentationml/2006/main">
   <p:cSld>
     <p:spTree>
@@ -4718,14 +3835,1122 @@
   <p:clrMapOvr>
     <a:masterClrMapping/>
   </p:clrMapOvr>
-  <mc:AlternateContent xmlns:mc="http://schemas.openxmlformats.org/markup-compatibility/2006" xmlns:p14="http://schemas.microsoft.com/office/powerpoint/2010/main">
-    <mc:Choice Requires="p14">
-      <p:transition spd="slow" p14:dur="2000" advTm="3279"/>
-    </mc:Choice>
-    <mc:Fallback xmlns="">
-      <p:transition spd="slow" advTm="3279"/>
-    </mc:Fallback>
-  </mc:AlternateContent>
+</p:sld>
+</file>
+
+<file path=ppt/slides/slide12.xml><?xml version="1.0" encoding="utf-8"?>
+<p:sld xmlns:a="http://schemas.openxmlformats.org/drawingml/2006/main" xmlns:r="http://schemas.openxmlformats.org/officeDocument/2006/relationships" xmlns:p="http://schemas.openxmlformats.org/presentationml/2006/main">
+  <p:cSld>
+    <p:spTree>
+      <p:nvGrpSpPr>
+        <p:cNvPr id="1" name=""/>
+        <p:cNvGrpSpPr/>
+        <p:nvPr/>
+      </p:nvGrpSpPr>
+      <p:grpSpPr>
+        <a:xfrm>
+          <a:off x="0" y="0"/>
+          <a:ext cx="0" cy="0"/>
+          <a:chOff x="0" y="0"/>
+          <a:chExt cx="0" cy="0"/>
+        </a:xfrm>
+      </p:grpSpPr>
+      <p:sp>
+        <p:nvSpPr>
+          <p:cNvPr id="2" name="Title 1">
+            <a:extLst>
+              <a:ext uri="{FF2B5EF4-FFF2-40B4-BE49-F238E27FC236}">
+                <a16:creationId xmlns:a16="http://schemas.microsoft.com/office/drawing/2014/main" id="{1BE7E900-0A32-4478-98CC-94F0848FDFF6}"/>
+              </a:ext>
+            </a:extLst>
+          </p:cNvPr>
+          <p:cNvSpPr>
+            <a:spLocks noGrp="1"/>
+          </p:cNvSpPr>
+          <p:nvPr>
+            <p:ph type="title"/>
+          </p:nvPr>
+        </p:nvSpPr>
+        <p:spPr/>
+        <p:txBody>
+          <a:bodyPr/>
+          <a:lstStyle/>
+          <a:p>
+            <a:r>
+              <a:rPr lang="en-US" dirty="0"/>
+              <a:t>Screenshots</a:t>
+            </a:r>
+          </a:p>
+        </p:txBody>
+      </p:sp>
+      <p:sp>
+        <p:nvSpPr>
+          <p:cNvPr id="4" name="Text Placeholder 3">
+            <a:extLst>
+              <a:ext uri="{FF2B5EF4-FFF2-40B4-BE49-F238E27FC236}">
+                <a16:creationId xmlns:a16="http://schemas.microsoft.com/office/drawing/2014/main" id="{2B9502DF-9147-493B-A29A-27EC08E3C685}"/>
+              </a:ext>
+            </a:extLst>
+          </p:cNvPr>
+          <p:cNvSpPr>
+            <a:spLocks noGrp="1"/>
+          </p:cNvSpPr>
+          <p:nvPr>
+            <p:ph type="body" idx="1"/>
+          </p:nvPr>
+        </p:nvSpPr>
+        <p:spPr/>
+        <p:txBody>
+          <a:bodyPr/>
+          <a:lstStyle/>
+          <a:p>
+            <a:r>
+              <a:rPr lang="en-US" dirty="0"/>
+              <a:t>Email Screen</a:t>
+            </a:r>
+          </a:p>
+        </p:txBody>
+      </p:sp>
+      <p:pic>
+        <p:nvPicPr>
+          <p:cNvPr id="9" name="Content Placeholder 8">
+            <a:extLst>
+              <a:ext uri="{FF2B5EF4-FFF2-40B4-BE49-F238E27FC236}">
+                <a16:creationId xmlns:a16="http://schemas.microsoft.com/office/drawing/2014/main" id="{203FA27E-3E63-45D4-B830-55A75F485E94}"/>
+              </a:ext>
+            </a:extLst>
+          </p:cNvPr>
+          <p:cNvPicPr>
+            <a:picLocks noGrp="1" noChangeAspect="1"/>
+          </p:cNvPicPr>
+          <p:nvPr>
+            <p:ph sz="half" idx="2"/>
+          </p:nvPr>
+        </p:nvPicPr>
+        <p:blipFill>
+          <a:blip r:embed="rId2"/>
+          <a:stretch>
+            <a:fillRect/>
+          </a:stretch>
+        </p:blipFill>
+        <p:spPr>
+          <a:xfrm>
+            <a:off x="4627923" y="2207274"/>
+            <a:ext cx="1953491" cy="3470564"/>
+          </a:xfrm>
+        </p:spPr>
+      </p:pic>
+    </p:spTree>
+    <p:extLst>
+      <p:ext uri="{BB962C8B-B14F-4D97-AF65-F5344CB8AC3E}">
+        <p14:creationId xmlns:p14="http://schemas.microsoft.com/office/powerpoint/2010/main" val="1173204491"/>
+      </p:ext>
+    </p:extLst>
+  </p:cSld>
+  <p:clrMapOvr>
+    <a:masterClrMapping/>
+  </p:clrMapOvr>
+</p:sld>
+</file>
+
+<file path=ppt/slides/slide13.xml><?xml version="1.0" encoding="utf-8"?>
+<p:sld xmlns:a="http://schemas.openxmlformats.org/drawingml/2006/main" xmlns:r="http://schemas.openxmlformats.org/officeDocument/2006/relationships" xmlns:p="http://schemas.openxmlformats.org/presentationml/2006/main">
+  <p:cSld>
+    <p:spTree>
+      <p:nvGrpSpPr>
+        <p:cNvPr id="1" name=""/>
+        <p:cNvGrpSpPr/>
+        <p:nvPr/>
+      </p:nvGrpSpPr>
+      <p:grpSpPr>
+        <a:xfrm>
+          <a:off x="0" y="0"/>
+          <a:ext cx="0" cy="0"/>
+          <a:chOff x="0" y="0"/>
+          <a:chExt cx="0" cy="0"/>
+        </a:xfrm>
+      </p:grpSpPr>
+      <p:sp>
+        <p:nvSpPr>
+          <p:cNvPr id="2" name="Title 1">
+            <a:extLst>
+              <a:ext uri="{FF2B5EF4-FFF2-40B4-BE49-F238E27FC236}">
+                <a16:creationId xmlns:a16="http://schemas.microsoft.com/office/drawing/2014/main" id="{04EBE504-5274-4F21-B433-A82393104628}"/>
+              </a:ext>
+            </a:extLst>
+          </p:cNvPr>
+          <p:cNvSpPr>
+            <a:spLocks noGrp="1"/>
+          </p:cNvSpPr>
+          <p:nvPr>
+            <p:ph type="title"/>
+          </p:nvPr>
+        </p:nvSpPr>
+        <p:spPr/>
+        <p:txBody>
+          <a:bodyPr/>
+          <a:lstStyle/>
+          <a:p>
+            <a:r>
+              <a:rPr lang="en-US" dirty="0"/>
+              <a:t>Conclusion</a:t>
+            </a:r>
+          </a:p>
+        </p:txBody>
+      </p:sp>
+      <p:sp>
+        <p:nvSpPr>
+          <p:cNvPr id="8" name="Content Placeholder 7">
+            <a:extLst>
+              <a:ext uri="{FF2B5EF4-FFF2-40B4-BE49-F238E27FC236}">
+                <a16:creationId xmlns:a16="http://schemas.microsoft.com/office/drawing/2014/main" id="{7F06AE6A-E773-4855-8FFF-25B1B7653A8A}"/>
+              </a:ext>
+            </a:extLst>
+          </p:cNvPr>
+          <p:cNvSpPr>
+            <a:spLocks noGrp="1"/>
+          </p:cNvSpPr>
+          <p:nvPr>
+            <p:ph idx="1"/>
+          </p:nvPr>
+        </p:nvSpPr>
+        <p:spPr/>
+        <p:txBody>
+          <a:bodyPr/>
+          <a:lstStyle/>
+          <a:p>
+            <a:r>
+              <a:rPr lang="en-US" dirty="0"/>
+              <a:t>By online voting system percentage of voting is increases and cost and time of voting process is decreases.</a:t>
+            </a:r>
+          </a:p>
+          <a:p>
+            <a:r>
+              <a:rPr lang="en-US" dirty="0"/>
+              <a:t>It is easy to use and it is less time consuming. </a:t>
+            </a:r>
+          </a:p>
+          <a:p>
+            <a:r>
+              <a:rPr lang="en-US" dirty="0"/>
+              <a:t>It is very easy to debug.</a:t>
+            </a:r>
+          </a:p>
+        </p:txBody>
+      </p:sp>
+    </p:spTree>
+    <p:extLst>
+      <p:ext uri="{BB962C8B-B14F-4D97-AF65-F5344CB8AC3E}">
+        <p14:creationId xmlns:p14="http://schemas.microsoft.com/office/powerpoint/2010/main" val="1288262401"/>
+      </p:ext>
+    </p:extLst>
+  </p:cSld>
+  <p:clrMapOvr>
+    <a:masterClrMapping/>
+  </p:clrMapOvr>
+</p:sld>
+</file>
+
+<file path=ppt/slides/slide14.xml><?xml version="1.0" encoding="utf-8"?>
+<p:sld xmlns:a="http://schemas.openxmlformats.org/drawingml/2006/main" xmlns:r="http://schemas.openxmlformats.org/officeDocument/2006/relationships" xmlns:p="http://schemas.openxmlformats.org/presentationml/2006/main">
+  <p:cSld>
+    <p:spTree>
+      <p:nvGrpSpPr>
+        <p:cNvPr id="1" name=""/>
+        <p:cNvGrpSpPr/>
+        <p:nvPr/>
+      </p:nvGrpSpPr>
+      <p:grpSpPr>
+        <a:xfrm>
+          <a:off x="0" y="0"/>
+          <a:ext cx="0" cy="0"/>
+          <a:chOff x="0" y="0"/>
+          <a:chExt cx="0" cy="0"/>
+        </a:xfrm>
+      </p:grpSpPr>
+      <p:sp>
+        <p:nvSpPr>
+          <p:cNvPr id="4" name="Title 3">
+            <a:extLst>
+              <a:ext uri="{FF2B5EF4-FFF2-40B4-BE49-F238E27FC236}">
+                <a16:creationId xmlns:a16="http://schemas.microsoft.com/office/drawing/2014/main" id="{440EE3DF-0156-4E4D-A5B8-78D797526946}"/>
+              </a:ext>
+            </a:extLst>
+          </p:cNvPr>
+          <p:cNvSpPr>
+            <a:spLocks noGrp="1"/>
+          </p:cNvSpPr>
+          <p:nvPr>
+            <p:ph type="title"/>
+          </p:nvPr>
+        </p:nvSpPr>
+        <p:spPr/>
+        <p:txBody>
+          <a:bodyPr/>
+          <a:lstStyle/>
+          <a:p>
+            <a:r>
+              <a:rPr lang="en-US" dirty="0"/>
+              <a:t>Thank You!!</a:t>
+            </a:r>
+          </a:p>
+        </p:txBody>
+      </p:sp>
+      <p:pic>
+        <p:nvPicPr>
+          <p:cNvPr id="8" name="Picture Placeholder 7">
+            <a:extLst>
+              <a:ext uri="{FF2B5EF4-FFF2-40B4-BE49-F238E27FC236}">
+                <a16:creationId xmlns:a16="http://schemas.microsoft.com/office/drawing/2014/main" id="{E305FB75-300F-40B4-9551-1B39410723C6}"/>
+              </a:ext>
+            </a:extLst>
+          </p:cNvPr>
+          <p:cNvPicPr>
+            <a:picLocks noGrp="1" noChangeAspect="1"/>
+          </p:cNvPicPr>
+          <p:nvPr>
+            <p:ph type="pic" idx="1"/>
+          </p:nvPr>
+        </p:nvPicPr>
+        <p:blipFill>
+          <a:blip r:embed="rId2"/>
+          <a:stretch>
+            <a:fillRect/>
+          </a:stretch>
+        </p:blipFill>
+        <p:spPr>
+          <a:xfrm>
+            <a:off x="3570688" y="516646"/>
+            <a:ext cx="4546370" cy="5361828"/>
+          </a:xfrm>
+        </p:spPr>
+      </p:pic>
+      <p:sp>
+        <p:nvSpPr>
+          <p:cNvPr id="6" name="Text Placeholder 5">
+            <a:extLst>
+              <a:ext uri="{FF2B5EF4-FFF2-40B4-BE49-F238E27FC236}">
+                <a16:creationId xmlns:a16="http://schemas.microsoft.com/office/drawing/2014/main" id="{CE7A778D-DFEF-443A-8C2B-A203EB65EA5A}"/>
+              </a:ext>
+            </a:extLst>
+          </p:cNvPr>
+          <p:cNvSpPr>
+            <a:spLocks noGrp="1"/>
+          </p:cNvSpPr>
+          <p:nvPr>
+            <p:ph type="body" sz="half" idx="2"/>
+          </p:nvPr>
+        </p:nvSpPr>
+        <p:spPr/>
+        <p:txBody>
+          <a:bodyPr/>
+          <a:lstStyle/>
+          <a:p>
+            <a:endParaRPr lang="en-US" dirty="0"/>
+          </a:p>
+        </p:txBody>
+      </p:sp>
+    </p:spTree>
+    <p:extLst>
+      <p:ext uri="{BB962C8B-B14F-4D97-AF65-F5344CB8AC3E}">
+        <p14:creationId xmlns:p14="http://schemas.microsoft.com/office/powerpoint/2010/main" val="3300038344"/>
+      </p:ext>
+    </p:extLst>
+  </p:cSld>
+  <p:clrMapOvr>
+    <a:masterClrMapping/>
+  </p:clrMapOvr>
+</p:sld>
+</file>
+
+<file path=ppt/slides/slide2.xml><?xml version="1.0" encoding="utf-8"?>
+<p:sld xmlns:a="http://schemas.openxmlformats.org/drawingml/2006/main" xmlns:r="http://schemas.openxmlformats.org/officeDocument/2006/relationships" xmlns:p="http://schemas.openxmlformats.org/presentationml/2006/main">
+  <p:cSld>
+    <p:spTree>
+      <p:nvGrpSpPr>
+        <p:cNvPr id="1" name=""/>
+        <p:cNvGrpSpPr/>
+        <p:nvPr/>
+      </p:nvGrpSpPr>
+      <p:grpSpPr>
+        <a:xfrm>
+          <a:off x="0" y="0"/>
+          <a:ext cx="0" cy="0"/>
+          <a:chOff x="0" y="0"/>
+          <a:chExt cx="0" cy="0"/>
+        </a:xfrm>
+      </p:grpSpPr>
+      <p:sp>
+        <p:nvSpPr>
+          <p:cNvPr id="2" name="Title 1">
+            <a:extLst>
+              <a:ext uri="{FF2B5EF4-FFF2-40B4-BE49-F238E27FC236}">
+                <a16:creationId xmlns:a16="http://schemas.microsoft.com/office/drawing/2014/main" id="{84E2319C-8EEF-4612-A002-F1EA63C1840C}"/>
+              </a:ext>
+            </a:extLst>
+          </p:cNvPr>
+          <p:cNvSpPr>
+            <a:spLocks noGrp="1"/>
+          </p:cNvSpPr>
+          <p:nvPr>
+            <p:ph type="title"/>
+          </p:nvPr>
+        </p:nvSpPr>
+        <p:spPr/>
+        <p:txBody>
+          <a:bodyPr/>
+          <a:lstStyle/>
+          <a:p>
+            <a:r>
+              <a:rPr lang="en-US" dirty="0"/>
+              <a:t>Contents</a:t>
+            </a:r>
+          </a:p>
+        </p:txBody>
+      </p:sp>
+      <p:sp>
+        <p:nvSpPr>
+          <p:cNvPr id="3" name="Content Placeholder 2">
+            <a:extLst>
+              <a:ext uri="{FF2B5EF4-FFF2-40B4-BE49-F238E27FC236}">
+                <a16:creationId xmlns:a16="http://schemas.microsoft.com/office/drawing/2014/main" id="{A8B7FE18-6EEF-4666-A8B9-11F06F18F874}"/>
+              </a:ext>
+            </a:extLst>
+          </p:cNvPr>
+          <p:cNvSpPr>
+            <a:spLocks noGrp="1"/>
+          </p:cNvSpPr>
+          <p:nvPr>
+            <p:ph idx="1"/>
+          </p:nvPr>
+        </p:nvSpPr>
+        <p:spPr/>
+        <p:txBody>
+          <a:bodyPr/>
+          <a:lstStyle/>
+          <a:p>
+            <a:r>
+              <a:rPr lang="en-US" dirty="0"/>
+              <a:t>Introduction</a:t>
+            </a:r>
+          </a:p>
+          <a:p>
+            <a:r>
+              <a:rPr lang="en-US" dirty="0"/>
+              <a:t>Our System</a:t>
+            </a:r>
+          </a:p>
+          <a:p>
+            <a:r>
+              <a:rPr lang="en-US" dirty="0"/>
+              <a:t>Steps to be followed</a:t>
+            </a:r>
+          </a:p>
+          <a:p>
+            <a:r>
+              <a:rPr lang="en-US" dirty="0"/>
+              <a:t>Technology Leveraged</a:t>
+            </a:r>
+          </a:p>
+          <a:p>
+            <a:r>
+              <a:rPr lang="en-US" dirty="0"/>
+              <a:t>Target Audience</a:t>
+            </a:r>
+          </a:p>
+          <a:p>
+            <a:r>
+              <a:rPr lang="en-US" dirty="0"/>
+              <a:t>Screenshots</a:t>
+            </a:r>
+          </a:p>
+          <a:p>
+            <a:endParaRPr lang="en-US" dirty="0"/>
+          </a:p>
+        </p:txBody>
+      </p:sp>
+    </p:spTree>
+    <p:extLst>
+      <p:ext uri="{BB962C8B-B14F-4D97-AF65-F5344CB8AC3E}">
+        <p14:creationId xmlns:p14="http://schemas.microsoft.com/office/powerpoint/2010/main" val="3879172910"/>
+      </p:ext>
+    </p:extLst>
+  </p:cSld>
+  <p:clrMapOvr>
+    <a:masterClrMapping/>
+  </p:clrMapOvr>
+</p:sld>
+</file>
+
+<file path=ppt/slides/slide3.xml><?xml version="1.0" encoding="utf-8"?>
+<p:sld xmlns:a="http://schemas.openxmlformats.org/drawingml/2006/main" xmlns:r="http://schemas.openxmlformats.org/officeDocument/2006/relationships" xmlns:p="http://schemas.openxmlformats.org/presentationml/2006/main">
+  <p:cSld>
+    <p:spTree>
+      <p:nvGrpSpPr>
+        <p:cNvPr id="1" name=""/>
+        <p:cNvGrpSpPr/>
+        <p:nvPr/>
+      </p:nvGrpSpPr>
+      <p:grpSpPr>
+        <a:xfrm>
+          <a:off x="0" y="0"/>
+          <a:ext cx="0" cy="0"/>
+          <a:chOff x="0" y="0"/>
+          <a:chExt cx="0" cy="0"/>
+        </a:xfrm>
+      </p:grpSpPr>
+      <p:sp>
+        <p:nvSpPr>
+          <p:cNvPr id="2" name="Title 1">
+            <a:extLst>
+              <a:ext uri="{FF2B5EF4-FFF2-40B4-BE49-F238E27FC236}">
+                <a16:creationId xmlns:a16="http://schemas.microsoft.com/office/drawing/2014/main" id="{18F57465-EF5E-4C75-AB29-19CD0FE6C830}"/>
+              </a:ext>
+            </a:extLst>
+          </p:cNvPr>
+          <p:cNvSpPr>
+            <a:spLocks noGrp="1"/>
+          </p:cNvSpPr>
+          <p:nvPr>
+            <p:ph type="title"/>
+          </p:nvPr>
+        </p:nvSpPr>
+        <p:spPr/>
+        <p:txBody>
+          <a:bodyPr/>
+          <a:lstStyle/>
+          <a:p>
+            <a:r>
+              <a:rPr lang="en-US" dirty="0"/>
+              <a:t>Introduction</a:t>
+            </a:r>
+          </a:p>
+        </p:txBody>
+      </p:sp>
+      <p:sp>
+        <p:nvSpPr>
+          <p:cNvPr id="3" name="Content Placeholder 2">
+            <a:extLst>
+              <a:ext uri="{FF2B5EF4-FFF2-40B4-BE49-F238E27FC236}">
+                <a16:creationId xmlns:a16="http://schemas.microsoft.com/office/drawing/2014/main" id="{53683710-77AF-42A5-95CA-6D9C074E85ED}"/>
+              </a:ext>
+            </a:extLst>
+          </p:cNvPr>
+          <p:cNvSpPr>
+            <a:spLocks noGrp="1"/>
+          </p:cNvSpPr>
+          <p:nvPr>
+            <p:ph idx="1"/>
+          </p:nvPr>
+        </p:nvSpPr>
+        <p:spPr/>
+        <p:txBody>
+          <a:bodyPr>
+            <a:normAutofit/>
+          </a:bodyPr>
+          <a:lstStyle/>
+          <a:p>
+            <a:r>
+              <a:rPr lang="en-US" dirty="0"/>
+              <a:t>Online voting or E-voting refers to voting using electronic means to either aid or take care of the chores of casting and counting votes.</a:t>
+            </a:r>
+          </a:p>
+          <a:p>
+            <a:r>
+              <a:rPr lang="en-US" dirty="0"/>
+              <a:t>The proliferation of personal mobile devices in the form of tablets and smartphones, based on the Android operating system, presents a unique opportunity to empower isolated communities who traditionally have had a difficult time voting.</a:t>
+            </a:r>
+          </a:p>
+          <a:p>
+            <a:r>
+              <a:rPr lang="en-US" dirty="0"/>
+              <a:t>The project suggests the use of hashing. Authentication is made by comparing hashes using SHA-256. </a:t>
+            </a:r>
+          </a:p>
+          <a:p>
+            <a:r>
+              <a:rPr lang="en-US" dirty="0"/>
+              <a:t>The system is more secured. </a:t>
+            </a:r>
+          </a:p>
+          <a:p>
+            <a:r>
+              <a:rPr lang="en-US" dirty="0"/>
+              <a:t>Vote can be audited later by comparing hashes in a database.</a:t>
+            </a:r>
+          </a:p>
+        </p:txBody>
+      </p:sp>
+    </p:spTree>
+    <p:extLst>
+      <p:ext uri="{BB962C8B-B14F-4D97-AF65-F5344CB8AC3E}">
+        <p14:creationId xmlns:p14="http://schemas.microsoft.com/office/powerpoint/2010/main" val="3124871287"/>
+      </p:ext>
+    </p:extLst>
+  </p:cSld>
+  <p:clrMapOvr>
+    <a:masterClrMapping/>
+  </p:clrMapOvr>
+</p:sld>
+</file>
+
+<file path=ppt/slides/slide4.xml><?xml version="1.0" encoding="utf-8"?>
+<p:sld xmlns:a="http://schemas.openxmlformats.org/drawingml/2006/main" xmlns:r="http://schemas.openxmlformats.org/officeDocument/2006/relationships" xmlns:p="http://schemas.openxmlformats.org/presentationml/2006/main">
+  <p:cSld>
+    <p:spTree>
+      <p:nvGrpSpPr>
+        <p:cNvPr id="1" name=""/>
+        <p:cNvGrpSpPr/>
+        <p:nvPr/>
+      </p:nvGrpSpPr>
+      <p:grpSpPr>
+        <a:xfrm>
+          <a:off x="0" y="0"/>
+          <a:ext cx="0" cy="0"/>
+          <a:chOff x="0" y="0"/>
+          <a:chExt cx="0" cy="0"/>
+        </a:xfrm>
+      </p:grpSpPr>
+      <p:sp>
+        <p:nvSpPr>
+          <p:cNvPr id="2" name="Title 1">
+            <a:extLst>
+              <a:ext uri="{FF2B5EF4-FFF2-40B4-BE49-F238E27FC236}">
+                <a16:creationId xmlns:a16="http://schemas.microsoft.com/office/drawing/2014/main" id="{0E0238E9-3875-453D-B5ED-5CC39C754D28}"/>
+              </a:ext>
+            </a:extLst>
+          </p:cNvPr>
+          <p:cNvSpPr>
+            <a:spLocks noGrp="1"/>
+          </p:cNvSpPr>
+          <p:nvPr>
+            <p:ph type="title"/>
+          </p:nvPr>
+        </p:nvSpPr>
+        <p:spPr/>
+        <p:txBody>
+          <a:bodyPr/>
+          <a:lstStyle/>
+          <a:p>
+            <a:r>
+              <a:rPr lang="en-US" dirty="0"/>
+              <a:t>Our System</a:t>
+            </a:r>
+          </a:p>
+        </p:txBody>
+      </p:sp>
+      <p:sp>
+        <p:nvSpPr>
+          <p:cNvPr id="3" name="Content Placeholder 2">
+            <a:extLst>
+              <a:ext uri="{FF2B5EF4-FFF2-40B4-BE49-F238E27FC236}">
+                <a16:creationId xmlns:a16="http://schemas.microsoft.com/office/drawing/2014/main" id="{18CB6655-FC8B-4DE3-BF34-EE4D31141C84}"/>
+              </a:ext>
+            </a:extLst>
+          </p:cNvPr>
+          <p:cNvSpPr>
+            <a:spLocks noGrp="1"/>
+          </p:cNvSpPr>
+          <p:nvPr>
+            <p:ph idx="1"/>
+          </p:nvPr>
+        </p:nvSpPr>
+        <p:spPr/>
+        <p:txBody>
+          <a:bodyPr>
+            <a:normAutofit/>
+          </a:bodyPr>
+          <a:lstStyle/>
+          <a:p>
+            <a:r>
+              <a:rPr lang="en-US" dirty="0"/>
+              <a:t>Relevant agencies tasked with conducting the election shall make use of the National Electoral Roll database and send all registered voters a letter with information about the voting process.</a:t>
+            </a:r>
+          </a:p>
+          <a:p>
+            <a:r>
+              <a:rPr lang="en-US" dirty="0"/>
+              <a:t>The user opens the app and scans 2 pieces of information from the letter:</a:t>
+            </a:r>
+          </a:p>
+          <a:p>
+            <a:r>
+              <a:rPr lang="en-US" dirty="0"/>
+              <a:t>1. Information that authenticates him and his vote</a:t>
+            </a:r>
+          </a:p>
+          <a:p>
+            <a:r>
+              <a:rPr lang="en-US" dirty="0"/>
+              <a:t>2. The code that indicates his vote</a:t>
+            </a:r>
+          </a:p>
+        </p:txBody>
+      </p:sp>
+    </p:spTree>
+    <p:extLst>
+      <p:ext uri="{BB962C8B-B14F-4D97-AF65-F5344CB8AC3E}">
+        <p14:creationId xmlns:p14="http://schemas.microsoft.com/office/powerpoint/2010/main" val="3945933373"/>
+      </p:ext>
+    </p:extLst>
+  </p:cSld>
+  <p:clrMapOvr>
+    <a:masterClrMapping/>
+  </p:clrMapOvr>
+</p:sld>
+</file>
+
+<file path=ppt/slides/slide5.xml><?xml version="1.0" encoding="utf-8"?>
+<p:sld xmlns:a="http://schemas.openxmlformats.org/drawingml/2006/main" xmlns:r="http://schemas.openxmlformats.org/officeDocument/2006/relationships" xmlns:p="http://schemas.openxmlformats.org/presentationml/2006/main">
+  <p:cSld>
+    <p:spTree>
+      <p:nvGrpSpPr>
+        <p:cNvPr id="1" name=""/>
+        <p:cNvGrpSpPr/>
+        <p:nvPr/>
+      </p:nvGrpSpPr>
+      <p:grpSpPr>
+        <a:xfrm>
+          <a:off x="0" y="0"/>
+          <a:ext cx="0" cy="0"/>
+          <a:chOff x="0" y="0"/>
+          <a:chExt cx="0" cy="0"/>
+        </a:xfrm>
+      </p:grpSpPr>
+      <p:sp>
+        <p:nvSpPr>
+          <p:cNvPr id="2" name="Title 1">
+            <a:extLst>
+              <a:ext uri="{FF2B5EF4-FFF2-40B4-BE49-F238E27FC236}">
+                <a16:creationId xmlns:a16="http://schemas.microsoft.com/office/drawing/2014/main" id="{0E0238E9-3875-453D-B5ED-5CC39C754D28}"/>
+              </a:ext>
+            </a:extLst>
+          </p:cNvPr>
+          <p:cNvSpPr>
+            <a:spLocks noGrp="1"/>
+          </p:cNvSpPr>
+          <p:nvPr>
+            <p:ph type="title"/>
+          </p:nvPr>
+        </p:nvSpPr>
+        <p:spPr/>
+        <p:txBody>
+          <a:bodyPr/>
+          <a:lstStyle/>
+          <a:p>
+            <a:r>
+              <a:rPr lang="en-US" dirty="0"/>
+              <a:t>Our System</a:t>
+            </a:r>
+          </a:p>
+        </p:txBody>
+      </p:sp>
+      <p:sp>
+        <p:nvSpPr>
+          <p:cNvPr id="3" name="Content Placeholder 2">
+            <a:extLst>
+              <a:ext uri="{FF2B5EF4-FFF2-40B4-BE49-F238E27FC236}">
+                <a16:creationId xmlns:a16="http://schemas.microsoft.com/office/drawing/2014/main" id="{18CB6655-FC8B-4DE3-BF34-EE4D31141C84}"/>
+              </a:ext>
+            </a:extLst>
+          </p:cNvPr>
+          <p:cNvSpPr>
+            <a:spLocks noGrp="1"/>
+          </p:cNvSpPr>
+          <p:nvPr>
+            <p:ph idx="1"/>
+          </p:nvPr>
+        </p:nvSpPr>
+        <p:spPr/>
+        <p:txBody>
+          <a:bodyPr>
+            <a:normAutofit/>
+          </a:bodyPr>
+          <a:lstStyle/>
+          <a:p>
+            <a:r>
+              <a:rPr lang="en-US" dirty="0"/>
+              <a:t>These two pieces are not stored but immediately collected by the Google Gmail App. A ready-to-send email is generated with the two pieces of information. </a:t>
+            </a:r>
+          </a:p>
+          <a:p>
+            <a:r>
+              <a:rPr lang="en-US" dirty="0"/>
+              <a:t>The user can then send the email. </a:t>
+            </a:r>
+          </a:p>
+          <a:p>
+            <a:r>
+              <a:rPr lang="en-US" dirty="0"/>
+              <a:t>Gmail's built in header auditing and caching infrastructure will ensure that the email reaches its destination safe from mal-actors such as hackers, phishers, etc.</a:t>
+            </a:r>
+          </a:p>
+          <a:p>
+            <a:r>
+              <a:rPr lang="en-US" dirty="0"/>
+              <a:t>The government can then audit the vote itself with the relevant information provided, ensuring a reliable and rigorous election.</a:t>
+            </a:r>
+          </a:p>
+        </p:txBody>
+      </p:sp>
+    </p:spTree>
+    <p:extLst>
+      <p:ext uri="{BB962C8B-B14F-4D97-AF65-F5344CB8AC3E}">
+        <p14:creationId xmlns:p14="http://schemas.microsoft.com/office/powerpoint/2010/main" val="1602280510"/>
+      </p:ext>
+    </p:extLst>
+  </p:cSld>
+  <p:clrMapOvr>
+    <a:masterClrMapping/>
+  </p:clrMapOvr>
+</p:sld>
+</file>
+
+<file path=ppt/slides/slide6.xml><?xml version="1.0" encoding="utf-8"?>
+<p:sld xmlns:a="http://schemas.openxmlformats.org/drawingml/2006/main" xmlns:r="http://schemas.openxmlformats.org/officeDocument/2006/relationships" xmlns:p="http://schemas.openxmlformats.org/presentationml/2006/main">
+  <p:cSld>
+    <p:spTree>
+      <p:nvGrpSpPr>
+        <p:cNvPr id="1" name=""/>
+        <p:cNvGrpSpPr/>
+        <p:nvPr/>
+      </p:nvGrpSpPr>
+      <p:grpSpPr>
+        <a:xfrm>
+          <a:off x="0" y="0"/>
+          <a:ext cx="0" cy="0"/>
+          <a:chOff x="0" y="0"/>
+          <a:chExt cx="0" cy="0"/>
+        </a:xfrm>
+      </p:grpSpPr>
+      <p:sp>
+        <p:nvSpPr>
+          <p:cNvPr id="2" name="Title 1">
+            <a:extLst>
+              <a:ext uri="{FF2B5EF4-FFF2-40B4-BE49-F238E27FC236}">
+                <a16:creationId xmlns:a16="http://schemas.microsoft.com/office/drawing/2014/main" id="{57E0BFE9-D4B8-4865-84D6-7CCF73C101C9}"/>
+              </a:ext>
+            </a:extLst>
+          </p:cNvPr>
+          <p:cNvSpPr>
+            <a:spLocks noGrp="1"/>
+          </p:cNvSpPr>
+          <p:nvPr>
+            <p:ph type="title"/>
+          </p:nvPr>
+        </p:nvSpPr>
+        <p:spPr/>
+        <p:txBody>
+          <a:bodyPr/>
+          <a:lstStyle/>
+          <a:p>
+            <a:r>
+              <a:rPr lang="en-US" dirty="0"/>
+              <a:t>Steps To Be Followed</a:t>
+            </a:r>
+          </a:p>
+        </p:txBody>
+      </p:sp>
+      <p:sp>
+        <p:nvSpPr>
+          <p:cNvPr id="3" name="Content Placeholder 2">
+            <a:extLst>
+              <a:ext uri="{FF2B5EF4-FFF2-40B4-BE49-F238E27FC236}">
+                <a16:creationId xmlns:a16="http://schemas.microsoft.com/office/drawing/2014/main" id="{608FE067-974F-45D1-A4B7-DDBCB66CDCE6}"/>
+              </a:ext>
+            </a:extLst>
+          </p:cNvPr>
+          <p:cNvSpPr>
+            <a:spLocks noGrp="1"/>
+          </p:cNvSpPr>
+          <p:nvPr>
+            <p:ph idx="1"/>
+          </p:nvPr>
+        </p:nvSpPr>
+        <p:spPr/>
+        <p:txBody>
+          <a:bodyPr/>
+          <a:lstStyle/>
+          <a:p>
+            <a:r>
+              <a:rPr lang="en-US" dirty="0"/>
+              <a:t>1. User receives a letter with scan-able information.</a:t>
+            </a:r>
+          </a:p>
+          <a:p>
+            <a:r>
+              <a:rPr lang="en-US" dirty="0"/>
+              <a:t>2. User opens the app and scans his own information as well as the candidate he chooses to vote for.</a:t>
+            </a:r>
+          </a:p>
+          <a:p>
+            <a:r>
+              <a:rPr lang="en-US" dirty="0"/>
+              <a:t>3. An email in the Gmail App is automatically generated with encrypted data.</a:t>
+            </a:r>
+          </a:p>
+          <a:p>
+            <a:r>
+              <a:rPr lang="en-US" dirty="0"/>
+              <a:t>4. The user sends this email.</a:t>
+            </a:r>
+          </a:p>
+          <a:p>
+            <a:r>
+              <a:rPr lang="en-US" dirty="0"/>
+              <a:t>5. Email received is used to count votes for candidates.</a:t>
+            </a:r>
+          </a:p>
+          <a:p>
+            <a:r>
+              <a:rPr lang="en-US" dirty="0"/>
+              <a:t>6. The received email is verified and will count as a single vote.</a:t>
+            </a:r>
+          </a:p>
+          <a:p>
+            <a:r>
+              <a:rPr lang="en-US" dirty="0"/>
+              <a:t>7. The vote can be audited by verifying hashed user information.</a:t>
+            </a:r>
+          </a:p>
+        </p:txBody>
+      </p:sp>
+    </p:spTree>
+    <p:extLst>
+      <p:ext uri="{BB962C8B-B14F-4D97-AF65-F5344CB8AC3E}">
+        <p14:creationId xmlns:p14="http://schemas.microsoft.com/office/powerpoint/2010/main" val="383123595"/>
+      </p:ext>
+    </p:extLst>
+  </p:cSld>
+  <p:clrMapOvr>
+    <a:masterClrMapping/>
+  </p:clrMapOvr>
+</p:sld>
+</file>
+
+<file path=ppt/slides/slide7.xml><?xml version="1.0" encoding="utf-8"?>
+<p:sld xmlns:a="http://schemas.openxmlformats.org/drawingml/2006/main" xmlns:r="http://schemas.openxmlformats.org/officeDocument/2006/relationships" xmlns:p="http://schemas.openxmlformats.org/presentationml/2006/main">
+  <p:cSld>
+    <p:spTree>
+      <p:nvGrpSpPr>
+        <p:cNvPr id="1" name=""/>
+        <p:cNvGrpSpPr/>
+        <p:nvPr/>
+      </p:nvGrpSpPr>
+      <p:grpSpPr>
+        <a:xfrm>
+          <a:off x="0" y="0"/>
+          <a:ext cx="0" cy="0"/>
+          <a:chOff x="0" y="0"/>
+          <a:chExt cx="0" cy="0"/>
+        </a:xfrm>
+      </p:grpSpPr>
+      <p:sp>
+        <p:nvSpPr>
+          <p:cNvPr id="2" name="Title 1">
+            <a:extLst>
+              <a:ext uri="{FF2B5EF4-FFF2-40B4-BE49-F238E27FC236}">
+                <a16:creationId xmlns:a16="http://schemas.microsoft.com/office/drawing/2014/main" id="{12A3B32E-6D24-4BC1-921B-468A5BD1A498}"/>
+              </a:ext>
+            </a:extLst>
+          </p:cNvPr>
+          <p:cNvSpPr>
+            <a:spLocks noGrp="1"/>
+          </p:cNvSpPr>
+          <p:nvPr>
+            <p:ph type="title"/>
+          </p:nvPr>
+        </p:nvSpPr>
+        <p:spPr/>
+        <p:txBody>
+          <a:bodyPr/>
+          <a:lstStyle/>
+          <a:p>
+            <a:r>
+              <a:rPr lang="en-US" dirty="0"/>
+              <a:t>Technologies Leveraged</a:t>
+            </a:r>
+          </a:p>
+        </p:txBody>
+      </p:sp>
+      <p:sp>
+        <p:nvSpPr>
+          <p:cNvPr id="3" name="Content Placeholder 2">
+            <a:extLst>
+              <a:ext uri="{FF2B5EF4-FFF2-40B4-BE49-F238E27FC236}">
+                <a16:creationId xmlns:a16="http://schemas.microsoft.com/office/drawing/2014/main" id="{A5B12E7E-9771-4AD4-AD77-313C4BB182F9}"/>
+              </a:ext>
+            </a:extLst>
+          </p:cNvPr>
+          <p:cNvSpPr>
+            <a:spLocks noGrp="1"/>
+          </p:cNvSpPr>
+          <p:nvPr>
+            <p:ph idx="1"/>
+          </p:nvPr>
+        </p:nvSpPr>
+        <p:spPr/>
+        <p:txBody>
+          <a:bodyPr/>
+          <a:lstStyle/>
+          <a:p>
+            <a:r>
+              <a:rPr lang="en-US" dirty="0"/>
+              <a:t>Gmail is a zero-price, advertising-supported email service developed by Google. Users can access Gmail on the web and through mobile apps for Android and iOS.</a:t>
+            </a:r>
+          </a:p>
+          <a:p>
+            <a:r>
+              <a:rPr lang="en-US" dirty="0"/>
+              <a:t>Android is a mobile operating system developed by Google, based on the Linux kernel and designed primarily for touch screen mobile devices such as smart phones and tablets.</a:t>
+            </a:r>
+          </a:p>
+          <a:p>
+            <a:r>
+              <a:rPr lang="en-US" dirty="0"/>
+              <a:t>ZXing ("zebra crossing") is an open-source, multi-format 1D/2D barcode image processing library implemented in Java, with ports to other languages.</a:t>
+            </a:r>
+          </a:p>
+        </p:txBody>
+      </p:sp>
+    </p:spTree>
+    <p:extLst>
+      <p:ext uri="{BB962C8B-B14F-4D97-AF65-F5344CB8AC3E}">
+        <p14:creationId xmlns:p14="http://schemas.microsoft.com/office/powerpoint/2010/main" val="3833148299"/>
+      </p:ext>
+    </p:extLst>
+  </p:cSld>
+  <p:clrMapOvr>
+    <a:masterClrMapping/>
+  </p:clrMapOvr>
+</p:sld>
+</file>
+
+<file path=ppt/slides/slide8.xml><?xml version="1.0" encoding="utf-8"?>
+<p:sld xmlns:a="http://schemas.openxmlformats.org/drawingml/2006/main" xmlns:r="http://schemas.openxmlformats.org/officeDocument/2006/relationships" xmlns:p="http://schemas.openxmlformats.org/presentationml/2006/main">
+  <p:cSld>
+    <p:spTree>
+      <p:nvGrpSpPr>
+        <p:cNvPr id="1" name=""/>
+        <p:cNvGrpSpPr/>
+        <p:nvPr/>
+      </p:nvGrpSpPr>
+      <p:grpSpPr>
+        <a:xfrm>
+          <a:off x="0" y="0"/>
+          <a:ext cx="0" cy="0"/>
+          <a:chOff x="0" y="0"/>
+          <a:chExt cx="0" cy="0"/>
+        </a:xfrm>
+      </p:grpSpPr>
+      <p:sp>
+        <p:nvSpPr>
+          <p:cNvPr id="2" name="Title 1">
+            <a:extLst>
+              <a:ext uri="{FF2B5EF4-FFF2-40B4-BE49-F238E27FC236}">
+                <a16:creationId xmlns:a16="http://schemas.microsoft.com/office/drawing/2014/main" id="{61735F35-298B-4E05-9583-E47ED1617DB8}"/>
+              </a:ext>
+            </a:extLst>
+          </p:cNvPr>
+          <p:cNvSpPr>
+            <a:spLocks noGrp="1"/>
+          </p:cNvSpPr>
+          <p:nvPr>
+            <p:ph type="title"/>
+          </p:nvPr>
+        </p:nvSpPr>
+        <p:spPr/>
+        <p:txBody>
+          <a:bodyPr/>
+          <a:lstStyle/>
+          <a:p>
+            <a:r>
+              <a:rPr lang="en-US" dirty="0"/>
+              <a:t>Advantages</a:t>
+            </a:r>
+          </a:p>
+        </p:txBody>
+      </p:sp>
+      <p:sp>
+        <p:nvSpPr>
+          <p:cNvPr id="3" name="Content Placeholder 2">
+            <a:extLst>
+              <a:ext uri="{FF2B5EF4-FFF2-40B4-BE49-F238E27FC236}">
+                <a16:creationId xmlns:a16="http://schemas.microsoft.com/office/drawing/2014/main" id="{EE4021B6-3877-4CDF-AA92-9E221655B8DC}"/>
+              </a:ext>
+            </a:extLst>
+          </p:cNvPr>
+          <p:cNvSpPr>
+            <a:spLocks noGrp="1"/>
+          </p:cNvSpPr>
+          <p:nvPr>
+            <p:ph idx="1"/>
+          </p:nvPr>
+        </p:nvSpPr>
+        <p:spPr/>
+        <p:txBody>
+          <a:bodyPr/>
+          <a:lstStyle/>
+          <a:p>
+            <a:r>
+              <a:rPr lang="en-US" dirty="0"/>
+              <a:t>1. The system can be used anytime and from anywhere by the Voters.</a:t>
+            </a:r>
+          </a:p>
+          <a:p>
+            <a:r>
+              <a:rPr lang="en-US" dirty="0"/>
+              <a:t>2. No one can cast votes on behalf of others and multiple times.</a:t>
+            </a:r>
+          </a:p>
+          <a:p>
+            <a:r>
+              <a:rPr lang="en-US" dirty="0"/>
+              <a:t>3. Saves time and reduces human intervention.</a:t>
+            </a:r>
+          </a:p>
+          <a:p>
+            <a:r>
+              <a:rPr lang="en-US" dirty="0"/>
+              <a:t>4. The system is flexible and secured to be used.</a:t>
+            </a:r>
+          </a:p>
+          <a:p>
+            <a:r>
+              <a:rPr lang="en-US" dirty="0"/>
+              <a:t>5. Unique Identification of voter through user info hashes.</a:t>
+            </a:r>
+          </a:p>
+          <a:p>
+            <a:r>
+              <a:rPr lang="en-US" dirty="0"/>
+              <a:t>6. Extremely secure system with one time password.</a:t>
+            </a:r>
+          </a:p>
+          <a:p>
+            <a:r>
+              <a:rPr lang="en-US" dirty="0"/>
+              <a:t>7. Improves voting with friendly Android Interface.</a:t>
+            </a:r>
+          </a:p>
+          <a:p>
+            <a:r>
+              <a:rPr lang="en-US" dirty="0"/>
+              <a:t>8. No fraud vote can be submitted.</a:t>
+            </a:r>
+          </a:p>
+        </p:txBody>
+      </p:sp>
+    </p:spTree>
+    <p:extLst>
+      <p:ext uri="{BB962C8B-B14F-4D97-AF65-F5344CB8AC3E}">
+        <p14:creationId xmlns:p14="http://schemas.microsoft.com/office/powerpoint/2010/main" val="2294840840"/>
+      </p:ext>
+    </p:extLst>
+  </p:cSld>
+  <p:clrMapOvr>
+    <a:masterClrMapping/>
+  </p:clrMapOvr>
 </p:sld>
 </file>
 
@@ -4748,10 +4973,10 @@
       </p:grpSpPr>
       <p:sp>
         <p:nvSpPr>
-          <p:cNvPr id="2" name="Title 1">
+          <p:cNvPr id="5" name="Title 4">
             <a:extLst>
               <a:ext uri="{FF2B5EF4-FFF2-40B4-BE49-F238E27FC236}">
-                <a16:creationId xmlns:a16="http://schemas.microsoft.com/office/drawing/2014/main" id="{04EBE504-5274-4F21-B433-A82393104628}"/>
+                <a16:creationId xmlns:a16="http://schemas.microsoft.com/office/drawing/2014/main" id="{AD558320-0021-4D8A-80DD-931D0AC7D3B4}"/>
               </a:ext>
             </a:extLst>
           </p:cNvPr>
@@ -4769,17 +4994,17 @@
           <a:p>
             <a:r>
               <a:rPr lang="en-US" dirty="0"/>
-              <a:t>Conclusion</a:t>
-            </a:r>
-          </a:p>
-        </p:txBody>
-      </p:sp>
-      <p:sp>
-        <p:nvSpPr>
-          <p:cNvPr id="8" name="Content Placeholder 7">
+              <a:t>Target Audience</a:t>
+            </a:r>
+          </a:p>
+        </p:txBody>
+      </p:sp>
+      <p:sp>
+        <p:nvSpPr>
+          <p:cNvPr id="6" name="Content Placeholder 5">
             <a:extLst>
               <a:ext uri="{FF2B5EF4-FFF2-40B4-BE49-F238E27FC236}">
-                <a16:creationId xmlns:a16="http://schemas.microsoft.com/office/drawing/2014/main" id="{7F06AE6A-E773-4855-8FFF-25B1B7653A8A}"/>
+                <a16:creationId xmlns:a16="http://schemas.microsoft.com/office/drawing/2014/main" id="{02CDA3E2-7956-4ADA-8E0B-431718120742}"/>
               </a:ext>
             </a:extLst>
           </p:cNvPr>
@@ -4797,19 +5022,25 @@
           <a:p>
             <a:r>
               <a:rPr lang="en-US" dirty="0"/>
-              <a:t>By online voting system percentage of voting is increases and cost and time of voting process is decreases.</a:t>
-            </a:r>
-          </a:p>
-          <a:p>
-            <a:r>
-              <a:rPr lang="en-US" dirty="0"/>
-              <a:t>It is easy to use and it is less time consuming. </a:t>
-            </a:r>
-          </a:p>
-          <a:p>
-            <a:r>
-              <a:rPr lang="en-US" dirty="0"/>
-              <a:t>It is very easy to debug.</a:t>
+              <a:t>➢ Citizens who wish to vote in privacy of their homes</a:t>
+            </a:r>
+          </a:p>
+          <a:p>
+            <a:r>
+              <a:rPr lang="en-US" dirty="0"/>
+              <a:t>➢ Citizens who vote in violence-prone areas</a:t>
+            </a:r>
+          </a:p>
+          <a:p>
+            <a:r>
+              <a:rPr lang="en-US" dirty="0"/>
+              <a:t>➢ Citizens in remote areas who have difficulty in reaching voting stations</a:t>
+            </a:r>
+          </a:p>
+          <a:p>
+            <a:r>
+              <a:rPr lang="en-US" dirty="0"/>
+              <a:t>➢ Citizens who have difficulty in reaching voting stations due to lack of infrastructure in underdeveloped areas</a:t>
             </a:r>
           </a:p>
         </p:txBody>
@@ -4817,21 +5048,13 @@
     </p:spTree>
     <p:extLst>
       <p:ext uri="{BB962C8B-B14F-4D97-AF65-F5344CB8AC3E}">
-        <p14:creationId xmlns:p14="http://schemas.microsoft.com/office/powerpoint/2010/main" val="1288262401"/>
+        <p14:creationId xmlns:p14="http://schemas.microsoft.com/office/powerpoint/2010/main" val="986412671"/>
       </p:ext>
     </p:extLst>
   </p:cSld>
   <p:clrMapOvr>
     <a:masterClrMapping/>
   </p:clrMapOvr>
-  <mc:AlternateContent xmlns:mc="http://schemas.openxmlformats.org/markup-compatibility/2006" xmlns:p14="http://schemas.microsoft.com/office/powerpoint/2010/main">
-    <mc:Choice Requires="p14">
-      <p:transition spd="slow" p14:dur="2000" advTm="6807"/>
-    </mc:Choice>
-    <mc:Fallback xmlns="">
-      <p:transition spd="slow" advTm="6807"/>
-    </mc:Fallback>
-  </mc:AlternateContent>
 </p:sld>
 </file>
 

</xml_diff>